<commit_message>
Add evaluation and feedback Update presentation
</commit_message>
<xml_diff>
--- a/PA1/14-PA1-Presentation.pptx
+++ b/PA1/14-PA1-Presentation.pptx
@@ -206,7 +206,7 @@
           <a:p>
             <a:fld id="{18DCCD61-643D-44A5-A450-3A42A50CBC1E}" type="datetimeFigureOut">
               <a:rPr lang="en-US" smtClean="0"/>
-              <a:t>03/08/2017</a:t>
+              <a:t>8/3/2017</a:t>
             </a:fld>
             <a:endParaRPr lang="en-US"/>
           </a:p>
@@ -483,7 +483,7 @@
           <a:p>
             <a:fld id="{18DCCD61-643D-44A5-A450-3A42A50CBC1E}" type="datetimeFigureOut">
               <a:rPr lang="en-US" smtClean="0"/>
-              <a:t>03/08/2017</a:t>
+              <a:t>8/3/2017</a:t>
             </a:fld>
             <a:endParaRPr lang="en-US"/>
           </a:p>
@@ -736,7 +736,7 @@
           <a:p>
             <a:fld id="{18DCCD61-643D-44A5-A450-3A42A50CBC1E}" type="datetimeFigureOut">
               <a:rPr lang="en-US" smtClean="0"/>
-              <a:t>03/08/2017</a:t>
+              <a:t>8/3/2017</a:t>
             </a:fld>
             <a:endParaRPr lang="en-US"/>
           </a:p>
@@ -906,7 +906,7 @@
           <a:p>
             <a:fld id="{18DCCD61-643D-44A5-A450-3A42A50CBC1E}" type="datetimeFigureOut">
               <a:rPr lang="en-US" smtClean="0"/>
-              <a:t>03/08/2017</a:t>
+              <a:t>8/3/2017</a:t>
             </a:fld>
             <a:endParaRPr lang="en-US"/>
           </a:p>
@@ -1086,7 +1086,7 @@
           <a:p>
             <a:fld id="{18DCCD61-643D-44A5-A450-3A42A50CBC1E}" type="datetimeFigureOut">
               <a:rPr lang="en-US" smtClean="0"/>
-              <a:t>03/08/2017</a:t>
+              <a:t>8/3/2017</a:t>
             </a:fld>
             <a:endParaRPr lang="en-US"/>
           </a:p>
@@ -1676,7 +1676,7 @@
           <a:p>
             <a:fld id="{18DCCD61-643D-44A5-A450-3A42A50CBC1E}" type="datetimeFigureOut">
               <a:rPr lang="en-US" smtClean="0"/>
-              <a:t>03/08/2017</a:t>
+              <a:t>8/3/2017</a:t>
             </a:fld>
             <a:endParaRPr lang="en-US"/>
           </a:p>
@@ -1846,7 +1846,7 @@
           <a:p>
             <a:fld id="{18DCCD61-643D-44A5-A450-3A42A50CBC1E}" type="datetimeFigureOut">
               <a:rPr lang="en-US" smtClean="0"/>
-              <a:t>03/08/2017</a:t>
+              <a:t>8/3/2017</a:t>
             </a:fld>
             <a:endParaRPr lang="en-US"/>
           </a:p>
@@ -2092,7 +2092,7 @@
           <a:p>
             <a:fld id="{18DCCD61-643D-44A5-A450-3A42A50CBC1E}" type="datetimeFigureOut">
               <a:rPr lang="en-US" smtClean="0"/>
-              <a:t>03/08/2017</a:t>
+              <a:t>8/3/2017</a:t>
             </a:fld>
             <a:endParaRPr lang="en-US"/>
           </a:p>
@@ -2380,7 +2380,7 @@
           <a:p>
             <a:fld id="{18DCCD61-643D-44A5-A450-3A42A50CBC1E}" type="datetimeFigureOut">
               <a:rPr lang="en-US" smtClean="0"/>
-              <a:t>03/08/2017</a:t>
+              <a:t>8/3/2017</a:t>
             </a:fld>
             <a:endParaRPr lang="en-US"/>
           </a:p>
@@ -2802,7 +2802,7 @@
           <a:p>
             <a:fld id="{18DCCD61-643D-44A5-A450-3A42A50CBC1E}" type="datetimeFigureOut">
               <a:rPr lang="en-US" smtClean="0"/>
-              <a:t>03/08/2017</a:t>
+              <a:t>8/3/2017</a:t>
             </a:fld>
             <a:endParaRPr lang="en-US"/>
           </a:p>
@@ -2920,7 +2920,7 @@
           <a:p>
             <a:fld id="{18DCCD61-643D-44A5-A450-3A42A50CBC1E}" type="datetimeFigureOut">
               <a:rPr lang="en-US" smtClean="0"/>
-              <a:t>03/08/2017</a:t>
+              <a:t>8/3/2017</a:t>
             </a:fld>
             <a:endParaRPr lang="en-US"/>
           </a:p>
@@ -3424,7 +3424,7 @@
           <a:p>
             <a:fld id="{18DCCD61-643D-44A5-A450-3A42A50CBC1E}" type="datetimeFigureOut">
               <a:rPr lang="en-US" smtClean="0"/>
-              <a:t>03/08/2017</a:t>
+              <a:t>8/3/2017</a:t>
             </a:fld>
             <a:endParaRPr lang="en-US"/>
           </a:p>
@@ -4058,7 +4058,344 @@
               </a:rPr>
               <a:t>DẠY NẤU ĂN </a:t>
             </a:r>
-            <a:endParaRPr lang="en-US" altLang="ko-KR" sz="3600" b="1" dirty="0" smtClean="0">
+          </a:p>
+        </p:txBody>
+      </p:sp>
+      <p:sp>
+        <p:nvSpPr>
+          <p:cNvPr id="7" name="TextBox 6">
+            <a:hlinkClick r:id="rId2"/>
+          </p:cNvPr>
+          <p:cNvSpPr txBox="1"/>
+          <p:nvPr/>
+        </p:nvSpPr>
+        <p:spPr>
+          <a:xfrm>
+            <a:off x="0" y="6597932"/>
+            <a:ext cx="9144000" cy="261610"/>
+          </a:xfrm>
+          <a:prstGeom prst="rect">
+            <a:avLst/>
+          </a:prstGeom>
+          <a:noFill/>
+        </p:spPr>
+        <p:txBody>
+          <a:bodyPr wrap="square" rtlCol="0">
+            <a:spAutoFit/>
+          </a:bodyPr>
+          <a:lstStyle/>
+          <a:p>
+            <a:pPr algn="ctr"/>
+            <a:r>
+              <a:rPr lang="en-US" altLang="ko-KR" sz="1100" dirty="0" smtClean="0">
+                <a:solidFill>
+                  <a:schemeClr val="tx1">
+                    <a:lumMod val="75000"/>
+                    <a:lumOff val="25000"/>
+                  </a:schemeClr>
+                </a:solidFill>
+                <a:latin typeface="Tahoma" panose="020B0604030504040204" pitchFamily="34" charset="0"/>
+                <a:ea typeface="Tahoma" panose="020B0604030504040204" pitchFamily="34" charset="0"/>
+                <a:cs typeface="Tahoma" panose="020B0604030504040204" pitchFamily="34" charset="0"/>
+              </a:rPr>
+              <a:t>Copyright LACTROI – 2017</a:t>
+            </a:r>
+            <a:endParaRPr lang="ko-KR" altLang="en-US" sz="1100" dirty="0">
+              <a:solidFill>
+                <a:schemeClr val="tx1">
+                  <a:lumMod val="75000"/>
+                  <a:lumOff val="25000"/>
+                </a:schemeClr>
+              </a:solidFill>
+              <a:latin typeface="Tahoma" panose="020B0604030504040204" pitchFamily="34" charset="0"/>
+              <a:cs typeface="Tahoma" panose="020B0604030504040204" pitchFamily="34" charset="0"/>
+            </a:endParaRPr>
+          </a:p>
+        </p:txBody>
+      </p:sp>
+      <p:sp>
+        <p:nvSpPr>
+          <p:cNvPr id="8" name="TextBox 7"/>
+          <p:cNvSpPr txBox="1"/>
+          <p:nvPr/>
+        </p:nvSpPr>
+        <p:spPr>
+          <a:xfrm>
+            <a:off x="107504" y="8374"/>
+            <a:ext cx="7200800" cy="584775"/>
+          </a:xfrm>
+          <a:prstGeom prst="rect">
+            <a:avLst/>
+          </a:prstGeom>
+          <a:noFill/>
+        </p:spPr>
+        <p:txBody>
+          <a:bodyPr wrap="square">
+            <a:spAutoFit/>
+          </a:bodyPr>
+          <a:lstStyle/>
+          <a:p>
+            <a:pPr algn="r" fontAlgn="auto">
+              <a:spcBef>
+                <a:spcPts val="0"/>
+              </a:spcBef>
+              <a:spcAft>
+                <a:spcPts val="0"/>
+              </a:spcAft>
+              <a:defRPr/>
+            </a:pPr>
+            <a:r>
+              <a:rPr lang="en-US" altLang="ko-KR" sz="1600" dirty="0" smtClean="0">
+                <a:solidFill>
+                  <a:schemeClr val="tx1">
+                    <a:lumMod val="75000"/>
+                    <a:lumOff val="25000"/>
+                  </a:schemeClr>
+                </a:solidFill>
+                <a:latin typeface="Tahoma" panose="020B0604030504040204" pitchFamily="34" charset="0"/>
+                <a:ea typeface="Tahoma" panose="020B0604030504040204" pitchFamily="34" charset="0"/>
+                <a:cs typeface="Tahoma" panose="020B0604030504040204" pitchFamily="34" charset="0"/>
+              </a:rPr>
+              <a:t>ĐH </a:t>
+            </a:r>
+            <a:r>
+              <a:rPr lang="en-US" altLang="ko-KR" sz="1600" dirty="0" err="1" smtClean="0">
+                <a:solidFill>
+                  <a:schemeClr val="tx1">
+                    <a:lumMod val="75000"/>
+                    <a:lumOff val="25000"/>
+                  </a:schemeClr>
+                </a:solidFill>
+                <a:latin typeface="Tahoma" panose="020B0604030504040204" pitchFamily="34" charset="0"/>
+                <a:ea typeface="Tahoma" panose="020B0604030504040204" pitchFamily="34" charset="0"/>
+                <a:cs typeface="Tahoma" panose="020B0604030504040204" pitchFamily="34" charset="0"/>
+              </a:rPr>
+              <a:t>Khoa</a:t>
+            </a:r>
+            <a:r>
+              <a:rPr lang="en-US" altLang="ko-KR" sz="1600" dirty="0" smtClean="0">
+                <a:solidFill>
+                  <a:schemeClr val="tx1">
+                    <a:lumMod val="75000"/>
+                    <a:lumOff val="25000"/>
+                  </a:schemeClr>
+                </a:solidFill>
+                <a:latin typeface="Tahoma" panose="020B0604030504040204" pitchFamily="34" charset="0"/>
+                <a:ea typeface="Tahoma" panose="020B0604030504040204" pitchFamily="34" charset="0"/>
+                <a:cs typeface="Tahoma" panose="020B0604030504040204" pitchFamily="34" charset="0"/>
+              </a:rPr>
+              <a:t> </a:t>
+            </a:r>
+            <a:r>
+              <a:rPr lang="en-US" altLang="ko-KR" sz="1600" dirty="0" err="1" smtClean="0">
+                <a:solidFill>
+                  <a:schemeClr val="tx1">
+                    <a:lumMod val="75000"/>
+                    <a:lumOff val="25000"/>
+                  </a:schemeClr>
+                </a:solidFill>
+                <a:latin typeface="Tahoma" panose="020B0604030504040204" pitchFamily="34" charset="0"/>
+                <a:ea typeface="Tahoma" panose="020B0604030504040204" pitchFamily="34" charset="0"/>
+                <a:cs typeface="Tahoma" panose="020B0604030504040204" pitchFamily="34" charset="0"/>
+              </a:rPr>
+              <a:t>Học</a:t>
+            </a:r>
+            <a:r>
+              <a:rPr lang="en-US" altLang="ko-KR" sz="1600" dirty="0" smtClean="0">
+                <a:solidFill>
+                  <a:schemeClr val="tx1">
+                    <a:lumMod val="75000"/>
+                    <a:lumOff val="25000"/>
+                  </a:schemeClr>
+                </a:solidFill>
+                <a:latin typeface="Tahoma" panose="020B0604030504040204" pitchFamily="34" charset="0"/>
+                <a:ea typeface="Tahoma" panose="020B0604030504040204" pitchFamily="34" charset="0"/>
+                <a:cs typeface="Tahoma" panose="020B0604030504040204" pitchFamily="34" charset="0"/>
+              </a:rPr>
+              <a:t> </a:t>
+            </a:r>
+            <a:r>
+              <a:rPr lang="en-US" altLang="ko-KR" sz="1600" dirty="0" err="1" smtClean="0">
+                <a:solidFill>
+                  <a:schemeClr val="tx1">
+                    <a:lumMod val="75000"/>
+                    <a:lumOff val="25000"/>
+                  </a:schemeClr>
+                </a:solidFill>
+                <a:latin typeface="Tahoma" panose="020B0604030504040204" pitchFamily="34" charset="0"/>
+                <a:ea typeface="Tahoma" panose="020B0604030504040204" pitchFamily="34" charset="0"/>
+                <a:cs typeface="Tahoma" panose="020B0604030504040204" pitchFamily="34" charset="0"/>
+              </a:rPr>
+              <a:t>Tự</a:t>
+            </a:r>
+            <a:r>
+              <a:rPr lang="en-US" altLang="ko-KR" sz="1600" dirty="0" smtClean="0">
+                <a:solidFill>
+                  <a:schemeClr val="tx1">
+                    <a:lumMod val="75000"/>
+                    <a:lumOff val="25000"/>
+                  </a:schemeClr>
+                </a:solidFill>
+                <a:latin typeface="Tahoma" panose="020B0604030504040204" pitchFamily="34" charset="0"/>
+                <a:ea typeface="Tahoma" panose="020B0604030504040204" pitchFamily="34" charset="0"/>
+                <a:cs typeface="Tahoma" panose="020B0604030504040204" pitchFamily="34" charset="0"/>
+              </a:rPr>
+              <a:t> </a:t>
+            </a:r>
+            <a:r>
+              <a:rPr lang="en-US" altLang="ko-KR" sz="1600" dirty="0" err="1" smtClean="0">
+                <a:solidFill>
+                  <a:schemeClr val="tx1">
+                    <a:lumMod val="75000"/>
+                    <a:lumOff val="25000"/>
+                  </a:schemeClr>
+                </a:solidFill>
+                <a:latin typeface="Tahoma" panose="020B0604030504040204" pitchFamily="34" charset="0"/>
+                <a:ea typeface="Tahoma" panose="020B0604030504040204" pitchFamily="34" charset="0"/>
+                <a:cs typeface="Tahoma" panose="020B0604030504040204" pitchFamily="34" charset="0"/>
+              </a:rPr>
+              <a:t>Nhiên</a:t>
+            </a:r>
+            <a:r>
+              <a:rPr lang="en-US" altLang="ko-KR" sz="1600" dirty="0" smtClean="0">
+                <a:solidFill>
+                  <a:schemeClr val="tx1">
+                    <a:lumMod val="75000"/>
+                    <a:lumOff val="25000"/>
+                  </a:schemeClr>
+                </a:solidFill>
+                <a:latin typeface="Tahoma" panose="020B0604030504040204" pitchFamily="34" charset="0"/>
+                <a:ea typeface="Tahoma" panose="020B0604030504040204" pitchFamily="34" charset="0"/>
+                <a:cs typeface="Tahoma" panose="020B0604030504040204" pitchFamily="34" charset="0"/>
+              </a:rPr>
+              <a:t/>
+            </a:r>
+            <a:br>
+              <a:rPr lang="en-US" altLang="ko-KR" sz="1600" dirty="0" smtClean="0">
+                <a:solidFill>
+                  <a:schemeClr val="tx1">
+                    <a:lumMod val="75000"/>
+                    <a:lumOff val="25000"/>
+                  </a:schemeClr>
+                </a:solidFill>
+                <a:latin typeface="Tahoma" panose="020B0604030504040204" pitchFamily="34" charset="0"/>
+                <a:ea typeface="Tahoma" panose="020B0604030504040204" pitchFamily="34" charset="0"/>
+                <a:cs typeface="Tahoma" panose="020B0604030504040204" pitchFamily="34" charset="0"/>
+              </a:rPr>
+            </a:br>
+            <a:r>
+              <a:rPr lang="en-US" altLang="ko-KR" sz="1600" dirty="0" err="1" smtClean="0">
+                <a:solidFill>
+                  <a:schemeClr val="tx1">
+                    <a:lumMod val="75000"/>
+                    <a:lumOff val="25000"/>
+                  </a:schemeClr>
+                </a:solidFill>
+                <a:latin typeface="Tahoma" panose="020B0604030504040204" pitchFamily="34" charset="0"/>
+                <a:ea typeface="Tahoma" panose="020B0604030504040204" pitchFamily="34" charset="0"/>
+                <a:cs typeface="Tahoma" panose="020B0604030504040204" pitchFamily="34" charset="0"/>
+              </a:rPr>
+              <a:t>Khoa</a:t>
+            </a:r>
+            <a:r>
+              <a:rPr lang="en-US" altLang="ko-KR" sz="1600" dirty="0" smtClean="0">
+                <a:solidFill>
+                  <a:schemeClr val="tx1">
+                    <a:lumMod val="75000"/>
+                    <a:lumOff val="25000"/>
+                  </a:schemeClr>
+                </a:solidFill>
+                <a:latin typeface="Tahoma" panose="020B0604030504040204" pitchFamily="34" charset="0"/>
+                <a:ea typeface="Tahoma" panose="020B0604030504040204" pitchFamily="34" charset="0"/>
+                <a:cs typeface="Tahoma" panose="020B0604030504040204" pitchFamily="34" charset="0"/>
+              </a:rPr>
+              <a:t> </a:t>
+            </a:r>
+            <a:r>
+              <a:rPr lang="en-US" altLang="ko-KR" sz="1600" dirty="0" err="1" smtClean="0">
+                <a:solidFill>
+                  <a:schemeClr val="tx1">
+                    <a:lumMod val="75000"/>
+                    <a:lumOff val="25000"/>
+                  </a:schemeClr>
+                </a:solidFill>
+                <a:latin typeface="Tahoma" panose="020B0604030504040204" pitchFamily="34" charset="0"/>
+                <a:ea typeface="Tahoma" panose="020B0604030504040204" pitchFamily="34" charset="0"/>
+                <a:cs typeface="Tahoma" panose="020B0604030504040204" pitchFamily="34" charset="0"/>
+              </a:rPr>
+              <a:t>Công</a:t>
+            </a:r>
+            <a:r>
+              <a:rPr lang="en-US" altLang="ko-KR" sz="1600" dirty="0" smtClean="0">
+                <a:solidFill>
+                  <a:schemeClr val="tx1">
+                    <a:lumMod val="75000"/>
+                    <a:lumOff val="25000"/>
+                  </a:schemeClr>
+                </a:solidFill>
+                <a:latin typeface="Tahoma" panose="020B0604030504040204" pitchFamily="34" charset="0"/>
+                <a:ea typeface="Tahoma" panose="020B0604030504040204" pitchFamily="34" charset="0"/>
+                <a:cs typeface="Tahoma" panose="020B0604030504040204" pitchFamily="34" charset="0"/>
+              </a:rPr>
+              <a:t> </a:t>
+            </a:r>
+            <a:r>
+              <a:rPr lang="en-US" altLang="ko-KR" sz="1600" dirty="0" err="1" smtClean="0">
+                <a:solidFill>
+                  <a:schemeClr val="tx1">
+                    <a:lumMod val="75000"/>
+                    <a:lumOff val="25000"/>
+                  </a:schemeClr>
+                </a:solidFill>
+                <a:latin typeface="Tahoma" panose="020B0604030504040204" pitchFamily="34" charset="0"/>
+                <a:ea typeface="Tahoma" panose="020B0604030504040204" pitchFamily="34" charset="0"/>
+                <a:cs typeface="Tahoma" panose="020B0604030504040204" pitchFamily="34" charset="0"/>
+              </a:rPr>
+              <a:t>Nghệ</a:t>
+            </a:r>
+            <a:r>
+              <a:rPr lang="en-US" altLang="ko-KR" sz="1600" dirty="0" smtClean="0">
+                <a:solidFill>
+                  <a:schemeClr val="tx1">
+                    <a:lumMod val="75000"/>
+                    <a:lumOff val="25000"/>
+                  </a:schemeClr>
+                </a:solidFill>
+                <a:latin typeface="Tahoma" panose="020B0604030504040204" pitchFamily="34" charset="0"/>
+                <a:ea typeface="Tahoma" panose="020B0604030504040204" pitchFamily="34" charset="0"/>
+                <a:cs typeface="Tahoma" panose="020B0604030504040204" pitchFamily="34" charset="0"/>
+              </a:rPr>
+              <a:t> </a:t>
+            </a:r>
+            <a:r>
+              <a:rPr lang="en-US" altLang="ko-KR" sz="1600" dirty="0" err="1" smtClean="0">
+                <a:solidFill>
+                  <a:schemeClr val="tx1">
+                    <a:lumMod val="75000"/>
+                    <a:lumOff val="25000"/>
+                  </a:schemeClr>
+                </a:solidFill>
+                <a:latin typeface="Tahoma" panose="020B0604030504040204" pitchFamily="34" charset="0"/>
+                <a:ea typeface="Tahoma" panose="020B0604030504040204" pitchFamily="34" charset="0"/>
+                <a:cs typeface="Tahoma" panose="020B0604030504040204" pitchFamily="34" charset="0"/>
+              </a:rPr>
+              <a:t>Thông</a:t>
+            </a:r>
+            <a:r>
+              <a:rPr lang="en-US" altLang="ko-KR" sz="1600" dirty="0" smtClean="0">
+                <a:solidFill>
+                  <a:schemeClr val="tx1">
+                    <a:lumMod val="75000"/>
+                    <a:lumOff val="25000"/>
+                  </a:schemeClr>
+                </a:solidFill>
+                <a:latin typeface="Tahoma" panose="020B0604030504040204" pitchFamily="34" charset="0"/>
+                <a:ea typeface="Tahoma" panose="020B0604030504040204" pitchFamily="34" charset="0"/>
+                <a:cs typeface="Tahoma" panose="020B0604030504040204" pitchFamily="34" charset="0"/>
+              </a:rPr>
+              <a:t> Tin</a:t>
+            </a:r>
+            <a:endParaRPr kumimoji="0" lang="en-US" altLang="ko-KR" sz="1600" dirty="0">
               <a:solidFill>
                 <a:schemeClr val="tx1">
                   <a:lumMod val="75000"/>
@@ -4074,16 +4411,14 @@
       </p:sp>
       <p:sp>
         <p:nvSpPr>
-          <p:cNvPr id="7" name="TextBox 6">
-            <a:hlinkClick r:id="rId2"/>
-          </p:cNvPr>
+          <p:cNvPr id="9" name="TextBox 8"/>
           <p:cNvSpPr txBox="1"/>
           <p:nvPr/>
         </p:nvSpPr>
         <p:spPr>
           <a:xfrm>
-            <a:off x="0" y="6597932"/>
-            <a:ext cx="9144000" cy="261610"/>
+            <a:off x="35497" y="2921124"/>
+            <a:ext cx="3240359" cy="338554"/>
           </a:xfrm>
           <a:prstGeom prst="rect">
             <a:avLst/>
@@ -4091,27 +4426,49 @@
           <a:noFill/>
         </p:spPr>
         <p:txBody>
-          <a:bodyPr wrap="square" rtlCol="0">
+          <a:bodyPr wrap="square">
             <a:spAutoFit/>
           </a:bodyPr>
           <a:lstStyle/>
           <a:p>
-            <a:pPr algn="ctr"/>
-            <a:r>
-              <a:rPr lang="en-US" altLang="ko-KR" sz="1100" dirty="0" smtClean="0">
-                <a:solidFill>
-                  <a:schemeClr val="tx1">
-                    <a:lumMod val="75000"/>
-                    <a:lumOff val="25000"/>
-                  </a:schemeClr>
-                </a:solidFill>
-                <a:latin typeface="Tahoma" panose="020B0604030504040204" pitchFamily="34" charset="0"/>
-                <a:ea typeface="Tahoma" panose="020B0604030504040204" pitchFamily="34" charset="0"/>
-                <a:cs typeface="Tahoma" panose="020B0604030504040204" pitchFamily="34" charset="0"/>
-              </a:rPr>
-              <a:t>Copyright LACTROI – 2017</a:t>
-            </a:r>
-            <a:endParaRPr lang="ko-KR" altLang="en-US" sz="1100" dirty="0">
+            <a:pPr algn="r" fontAlgn="auto">
+              <a:spcBef>
+                <a:spcPts val="0"/>
+              </a:spcBef>
+              <a:spcAft>
+                <a:spcPts val="0"/>
+              </a:spcAft>
+              <a:defRPr/>
+            </a:pPr>
+            <a:r>
+              <a:rPr lang="en-US" altLang="ko-KR" sz="1600" dirty="0" smtClean="0">
+                <a:solidFill>
+                  <a:schemeClr val="tx1">
+                    <a:lumMod val="75000"/>
+                    <a:lumOff val="25000"/>
+                  </a:schemeClr>
+                </a:solidFill>
+                <a:latin typeface="Tahoma" panose="020B0604030504040204" pitchFamily="34" charset="0"/>
+                <a:ea typeface="Tahoma" panose="020B0604030504040204" pitchFamily="34" charset="0"/>
+                <a:cs typeface="Tahoma" panose="020B0604030504040204" pitchFamily="34" charset="0"/>
+              </a:rPr>
+              <a:t>15HCB2 - LACTROI</a:t>
+            </a:r>
+            <a:r>
+              <a:rPr kumimoji="0" lang="en-US" altLang="ko-KR" sz="1600" dirty="0" smtClean="0">
+                <a:solidFill>
+                  <a:schemeClr val="tx1">
+                    <a:lumMod val="75000"/>
+                    <a:lumOff val="25000"/>
+                  </a:schemeClr>
+                </a:solidFill>
+                <a:latin typeface="Tahoma" panose="020B0604030504040204" pitchFamily="34" charset="0"/>
+                <a:ea typeface="Tahoma" panose="020B0604030504040204" pitchFamily="34" charset="0"/>
+                <a:cs typeface="Tahoma" panose="020B0604030504040204" pitchFamily="34" charset="0"/>
+              </a:rPr>
+              <a:t>    </a:t>
+            </a:r>
+            <a:endParaRPr kumimoji="0" lang="en-US" altLang="ko-KR" sz="1600" dirty="0">
               <a:solidFill>
                 <a:schemeClr val="tx1">
                   <a:lumMod val="75000"/>
@@ -4119,6 +4476,7 @@
                 </a:schemeClr>
               </a:solidFill>
               <a:latin typeface="Tahoma" panose="020B0604030504040204" pitchFamily="34" charset="0"/>
+              <a:ea typeface="Tahoma" panose="020B0604030504040204" pitchFamily="34" charset="0"/>
               <a:cs typeface="Tahoma" panose="020B0604030504040204" pitchFamily="34" charset="0"/>
             </a:endParaRPr>
           </a:p>
@@ -4126,24 +4484,15 @@
       </p:sp>
       <p:pic>
         <p:nvPicPr>
-          <p:cNvPr id="6" name="Picture 5"/>
+          <p:cNvPr id="2" name="Picture 1"/>
           <p:cNvPicPr>
             <a:picLocks noChangeAspect="1"/>
           </p:cNvPicPr>
           <p:nvPr/>
         </p:nvPicPr>
         <p:blipFill>
-          <a:blip r:embed="rId3" cstate="print">
+          <a:blip r:embed="rId3">
             <a:extLst>
-              <a:ext uri="{BEBA8EAE-BF5A-486C-A8C5-ECC9F3942E4B}">
-                <a14:imgProps xmlns:a14="http://schemas.microsoft.com/office/drawing/2010/main">
-                  <a14:imgLayer r:embed="rId4">
-                    <a14:imgEffect>
-                      <a14:brightnessContrast bright="-100000"/>
-                    </a14:imgEffect>
-                  </a14:imgLayer>
-                </a14:imgProps>
-              </a:ext>
               <a:ext uri="{28A0092B-C50C-407E-A947-70E740481C1C}">
                 <a14:useLocalDpi xmlns:a14="http://schemas.microsoft.com/office/drawing/2010/main" val="0"/>
               </a:ext>
@@ -4155,383 +4504,14 @@
         </p:blipFill>
         <p:spPr>
           <a:xfrm>
-            <a:off x="683568" y="4299698"/>
-            <a:ext cx="1301512" cy="321849"/>
+            <a:off x="784152" y="3933056"/>
+            <a:ext cx="1057588" cy="991490"/>
           </a:xfrm>
           <a:prstGeom prst="rect">
             <a:avLst/>
           </a:prstGeom>
         </p:spPr>
       </p:pic>
-      <p:sp>
-        <p:nvSpPr>
-          <p:cNvPr id="8" name="TextBox 7"/>
-          <p:cNvSpPr txBox="1"/>
-          <p:nvPr/>
-        </p:nvSpPr>
-        <p:spPr>
-          <a:xfrm>
-            <a:off x="107504" y="8374"/>
-            <a:ext cx="7200800" cy="584775"/>
-          </a:xfrm>
-          <a:prstGeom prst="rect">
-            <a:avLst/>
-          </a:prstGeom>
-          <a:noFill/>
-        </p:spPr>
-        <p:txBody>
-          <a:bodyPr wrap="square">
-            <a:spAutoFit/>
-          </a:bodyPr>
-          <a:lstStyle/>
-          <a:p>
-            <a:pPr algn="r" fontAlgn="auto">
-              <a:spcBef>
-                <a:spcPts val="0"/>
-              </a:spcBef>
-              <a:spcAft>
-                <a:spcPts val="0"/>
-              </a:spcAft>
-              <a:defRPr/>
-            </a:pPr>
-            <a:r>
-              <a:rPr lang="en-US" altLang="ko-KR" sz="1600" dirty="0" smtClean="0">
-                <a:solidFill>
-                  <a:schemeClr val="tx1">
-                    <a:lumMod val="75000"/>
-                    <a:lumOff val="25000"/>
-                  </a:schemeClr>
-                </a:solidFill>
-                <a:latin typeface="Tahoma" panose="020B0604030504040204" pitchFamily="34" charset="0"/>
-                <a:ea typeface="Tahoma" panose="020B0604030504040204" pitchFamily="34" charset="0"/>
-                <a:cs typeface="Tahoma" panose="020B0604030504040204" pitchFamily="34" charset="0"/>
-              </a:rPr>
-              <a:t>ĐH </a:t>
-            </a:r>
-            <a:r>
-              <a:rPr lang="en-US" altLang="ko-KR" sz="1600" dirty="0" err="1" smtClean="0">
-                <a:solidFill>
-                  <a:schemeClr val="tx1">
-                    <a:lumMod val="75000"/>
-                    <a:lumOff val="25000"/>
-                  </a:schemeClr>
-                </a:solidFill>
-                <a:latin typeface="Tahoma" panose="020B0604030504040204" pitchFamily="34" charset="0"/>
-                <a:ea typeface="Tahoma" panose="020B0604030504040204" pitchFamily="34" charset="0"/>
-                <a:cs typeface="Tahoma" panose="020B0604030504040204" pitchFamily="34" charset="0"/>
-              </a:rPr>
-              <a:t>Khoa</a:t>
-            </a:r>
-            <a:r>
-              <a:rPr lang="en-US" altLang="ko-KR" sz="1600" dirty="0" smtClean="0">
-                <a:solidFill>
-                  <a:schemeClr val="tx1">
-                    <a:lumMod val="75000"/>
-                    <a:lumOff val="25000"/>
-                  </a:schemeClr>
-                </a:solidFill>
-                <a:latin typeface="Tahoma" panose="020B0604030504040204" pitchFamily="34" charset="0"/>
-                <a:ea typeface="Tahoma" panose="020B0604030504040204" pitchFamily="34" charset="0"/>
-                <a:cs typeface="Tahoma" panose="020B0604030504040204" pitchFamily="34" charset="0"/>
-              </a:rPr>
-              <a:t> </a:t>
-            </a:r>
-            <a:r>
-              <a:rPr lang="en-US" altLang="ko-KR" sz="1600" dirty="0" err="1" smtClean="0">
-                <a:solidFill>
-                  <a:schemeClr val="tx1">
-                    <a:lumMod val="75000"/>
-                    <a:lumOff val="25000"/>
-                  </a:schemeClr>
-                </a:solidFill>
-                <a:latin typeface="Tahoma" panose="020B0604030504040204" pitchFamily="34" charset="0"/>
-                <a:ea typeface="Tahoma" panose="020B0604030504040204" pitchFamily="34" charset="0"/>
-                <a:cs typeface="Tahoma" panose="020B0604030504040204" pitchFamily="34" charset="0"/>
-              </a:rPr>
-              <a:t>Học</a:t>
-            </a:r>
-            <a:r>
-              <a:rPr lang="en-US" altLang="ko-KR" sz="1600" dirty="0" smtClean="0">
-                <a:solidFill>
-                  <a:schemeClr val="tx1">
-                    <a:lumMod val="75000"/>
-                    <a:lumOff val="25000"/>
-                  </a:schemeClr>
-                </a:solidFill>
-                <a:latin typeface="Tahoma" panose="020B0604030504040204" pitchFamily="34" charset="0"/>
-                <a:ea typeface="Tahoma" panose="020B0604030504040204" pitchFamily="34" charset="0"/>
-                <a:cs typeface="Tahoma" panose="020B0604030504040204" pitchFamily="34" charset="0"/>
-              </a:rPr>
-              <a:t> </a:t>
-            </a:r>
-            <a:r>
-              <a:rPr lang="en-US" altLang="ko-KR" sz="1600" dirty="0" err="1" smtClean="0">
-                <a:solidFill>
-                  <a:schemeClr val="tx1">
-                    <a:lumMod val="75000"/>
-                    <a:lumOff val="25000"/>
-                  </a:schemeClr>
-                </a:solidFill>
-                <a:latin typeface="Tahoma" panose="020B0604030504040204" pitchFamily="34" charset="0"/>
-                <a:ea typeface="Tahoma" panose="020B0604030504040204" pitchFamily="34" charset="0"/>
-                <a:cs typeface="Tahoma" panose="020B0604030504040204" pitchFamily="34" charset="0"/>
-              </a:rPr>
-              <a:t>Tự</a:t>
-            </a:r>
-            <a:r>
-              <a:rPr lang="en-US" altLang="ko-KR" sz="1600" dirty="0" smtClean="0">
-                <a:solidFill>
-                  <a:schemeClr val="tx1">
-                    <a:lumMod val="75000"/>
-                    <a:lumOff val="25000"/>
-                  </a:schemeClr>
-                </a:solidFill>
-                <a:latin typeface="Tahoma" panose="020B0604030504040204" pitchFamily="34" charset="0"/>
-                <a:ea typeface="Tahoma" panose="020B0604030504040204" pitchFamily="34" charset="0"/>
-                <a:cs typeface="Tahoma" panose="020B0604030504040204" pitchFamily="34" charset="0"/>
-              </a:rPr>
-              <a:t> </a:t>
-            </a:r>
-            <a:r>
-              <a:rPr lang="en-US" altLang="ko-KR" sz="1600" dirty="0" err="1" smtClean="0">
-                <a:solidFill>
-                  <a:schemeClr val="tx1">
-                    <a:lumMod val="75000"/>
-                    <a:lumOff val="25000"/>
-                  </a:schemeClr>
-                </a:solidFill>
-                <a:latin typeface="Tahoma" panose="020B0604030504040204" pitchFamily="34" charset="0"/>
-                <a:ea typeface="Tahoma" panose="020B0604030504040204" pitchFamily="34" charset="0"/>
-                <a:cs typeface="Tahoma" panose="020B0604030504040204" pitchFamily="34" charset="0"/>
-              </a:rPr>
-              <a:t>Nhiên</a:t>
-            </a:r>
-            <a:r>
-              <a:rPr lang="en-US" altLang="ko-KR" sz="1600" dirty="0" smtClean="0">
-                <a:solidFill>
-                  <a:schemeClr val="tx1">
-                    <a:lumMod val="75000"/>
-                    <a:lumOff val="25000"/>
-                  </a:schemeClr>
-                </a:solidFill>
-                <a:latin typeface="Tahoma" panose="020B0604030504040204" pitchFamily="34" charset="0"/>
-                <a:ea typeface="Tahoma" panose="020B0604030504040204" pitchFamily="34" charset="0"/>
-                <a:cs typeface="Tahoma" panose="020B0604030504040204" pitchFamily="34" charset="0"/>
-              </a:rPr>
-              <a:t/>
-            </a:r>
-            <a:br>
-              <a:rPr lang="en-US" altLang="ko-KR" sz="1600" dirty="0" smtClean="0">
-                <a:solidFill>
-                  <a:schemeClr val="tx1">
-                    <a:lumMod val="75000"/>
-                    <a:lumOff val="25000"/>
-                  </a:schemeClr>
-                </a:solidFill>
-                <a:latin typeface="Tahoma" panose="020B0604030504040204" pitchFamily="34" charset="0"/>
-                <a:ea typeface="Tahoma" panose="020B0604030504040204" pitchFamily="34" charset="0"/>
-                <a:cs typeface="Tahoma" panose="020B0604030504040204" pitchFamily="34" charset="0"/>
-              </a:rPr>
-            </a:br>
-            <a:r>
-              <a:rPr lang="en-US" altLang="ko-KR" sz="1600" dirty="0" err="1" smtClean="0">
-                <a:solidFill>
-                  <a:schemeClr val="tx1">
-                    <a:lumMod val="75000"/>
-                    <a:lumOff val="25000"/>
-                  </a:schemeClr>
-                </a:solidFill>
-                <a:latin typeface="Tahoma" panose="020B0604030504040204" pitchFamily="34" charset="0"/>
-                <a:ea typeface="Tahoma" panose="020B0604030504040204" pitchFamily="34" charset="0"/>
-                <a:cs typeface="Tahoma" panose="020B0604030504040204" pitchFamily="34" charset="0"/>
-              </a:rPr>
-              <a:t>Khoa</a:t>
-            </a:r>
-            <a:r>
-              <a:rPr lang="en-US" altLang="ko-KR" sz="1600" dirty="0" smtClean="0">
-                <a:solidFill>
-                  <a:schemeClr val="tx1">
-                    <a:lumMod val="75000"/>
-                    <a:lumOff val="25000"/>
-                  </a:schemeClr>
-                </a:solidFill>
-                <a:latin typeface="Tahoma" panose="020B0604030504040204" pitchFamily="34" charset="0"/>
-                <a:ea typeface="Tahoma" panose="020B0604030504040204" pitchFamily="34" charset="0"/>
-                <a:cs typeface="Tahoma" panose="020B0604030504040204" pitchFamily="34" charset="0"/>
-              </a:rPr>
-              <a:t> </a:t>
-            </a:r>
-            <a:r>
-              <a:rPr lang="en-US" altLang="ko-KR" sz="1600" dirty="0" err="1" smtClean="0">
-                <a:solidFill>
-                  <a:schemeClr val="tx1">
-                    <a:lumMod val="75000"/>
-                    <a:lumOff val="25000"/>
-                  </a:schemeClr>
-                </a:solidFill>
-                <a:latin typeface="Tahoma" panose="020B0604030504040204" pitchFamily="34" charset="0"/>
-                <a:ea typeface="Tahoma" panose="020B0604030504040204" pitchFamily="34" charset="0"/>
-                <a:cs typeface="Tahoma" panose="020B0604030504040204" pitchFamily="34" charset="0"/>
-              </a:rPr>
-              <a:t>Công</a:t>
-            </a:r>
-            <a:r>
-              <a:rPr lang="en-US" altLang="ko-KR" sz="1600" dirty="0" smtClean="0">
-                <a:solidFill>
-                  <a:schemeClr val="tx1">
-                    <a:lumMod val="75000"/>
-                    <a:lumOff val="25000"/>
-                  </a:schemeClr>
-                </a:solidFill>
-                <a:latin typeface="Tahoma" panose="020B0604030504040204" pitchFamily="34" charset="0"/>
-                <a:ea typeface="Tahoma" panose="020B0604030504040204" pitchFamily="34" charset="0"/>
-                <a:cs typeface="Tahoma" panose="020B0604030504040204" pitchFamily="34" charset="0"/>
-              </a:rPr>
-              <a:t> </a:t>
-            </a:r>
-            <a:r>
-              <a:rPr lang="en-US" altLang="ko-KR" sz="1600" dirty="0" err="1" smtClean="0">
-                <a:solidFill>
-                  <a:schemeClr val="tx1">
-                    <a:lumMod val="75000"/>
-                    <a:lumOff val="25000"/>
-                  </a:schemeClr>
-                </a:solidFill>
-                <a:latin typeface="Tahoma" panose="020B0604030504040204" pitchFamily="34" charset="0"/>
-                <a:ea typeface="Tahoma" panose="020B0604030504040204" pitchFamily="34" charset="0"/>
-                <a:cs typeface="Tahoma" panose="020B0604030504040204" pitchFamily="34" charset="0"/>
-              </a:rPr>
-              <a:t>Nghệ</a:t>
-            </a:r>
-            <a:r>
-              <a:rPr lang="en-US" altLang="ko-KR" sz="1600" dirty="0" smtClean="0">
-                <a:solidFill>
-                  <a:schemeClr val="tx1">
-                    <a:lumMod val="75000"/>
-                    <a:lumOff val="25000"/>
-                  </a:schemeClr>
-                </a:solidFill>
-                <a:latin typeface="Tahoma" panose="020B0604030504040204" pitchFamily="34" charset="0"/>
-                <a:ea typeface="Tahoma" panose="020B0604030504040204" pitchFamily="34" charset="0"/>
-                <a:cs typeface="Tahoma" panose="020B0604030504040204" pitchFamily="34" charset="0"/>
-              </a:rPr>
-              <a:t> </a:t>
-            </a:r>
-            <a:r>
-              <a:rPr lang="en-US" altLang="ko-KR" sz="1600" dirty="0" err="1" smtClean="0">
-                <a:solidFill>
-                  <a:schemeClr val="tx1">
-                    <a:lumMod val="75000"/>
-                    <a:lumOff val="25000"/>
-                  </a:schemeClr>
-                </a:solidFill>
-                <a:latin typeface="Tahoma" panose="020B0604030504040204" pitchFamily="34" charset="0"/>
-                <a:ea typeface="Tahoma" panose="020B0604030504040204" pitchFamily="34" charset="0"/>
-                <a:cs typeface="Tahoma" panose="020B0604030504040204" pitchFamily="34" charset="0"/>
-              </a:rPr>
-              <a:t>Thông</a:t>
-            </a:r>
-            <a:r>
-              <a:rPr lang="en-US" altLang="ko-KR" sz="1600" dirty="0" smtClean="0">
-                <a:solidFill>
-                  <a:schemeClr val="tx1">
-                    <a:lumMod val="75000"/>
-                    <a:lumOff val="25000"/>
-                  </a:schemeClr>
-                </a:solidFill>
-                <a:latin typeface="Tahoma" panose="020B0604030504040204" pitchFamily="34" charset="0"/>
-                <a:ea typeface="Tahoma" panose="020B0604030504040204" pitchFamily="34" charset="0"/>
-                <a:cs typeface="Tahoma" panose="020B0604030504040204" pitchFamily="34" charset="0"/>
-              </a:rPr>
-              <a:t> Tin</a:t>
-            </a:r>
-            <a:endParaRPr kumimoji="0" lang="en-US" altLang="ko-KR" sz="1600" dirty="0">
-              <a:solidFill>
-                <a:schemeClr val="tx1">
-                  <a:lumMod val="75000"/>
-                  <a:lumOff val="25000"/>
-                </a:schemeClr>
-              </a:solidFill>
-              <a:latin typeface="Tahoma" panose="020B0604030504040204" pitchFamily="34" charset="0"/>
-              <a:ea typeface="Tahoma" panose="020B0604030504040204" pitchFamily="34" charset="0"/>
-              <a:cs typeface="Tahoma" panose="020B0604030504040204" pitchFamily="34" charset="0"/>
-            </a:endParaRPr>
-          </a:p>
-        </p:txBody>
-      </p:sp>
-      <p:sp>
-        <p:nvSpPr>
-          <p:cNvPr id="9" name="TextBox 8"/>
-          <p:cNvSpPr txBox="1"/>
-          <p:nvPr/>
-        </p:nvSpPr>
-        <p:spPr>
-          <a:xfrm>
-            <a:off x="35497" y="2921124"/>
-            <a:ext cx="3240359" cy="338554"/>
-          </a:xfrm>
-          <a:prstGeom prst="rect">
-            <a:avLst/>
-          </a:prstGeom>
-          <a:noFill/>
-        </p:spPr>
-        <p:txBody>
-          <a:bodyPr wrap="square">
-            <a:spAutoFit/>
-          </a:bodyPr>
-          <a:lstStyle/>
-          <a:p>
-            <a:pPr algn="r" fontAlgn="auto">
-              <a:spcBef>
-                <a:spcPts val="0"/>
-              </a:spcBef>
-              <a:spcAft>
-                <a:spcPts val="0"/>
-              </a:spcAft>
-              <a:defRPr/>
-            </a:pPr>
-            <a:r>
-              <a:rPr lang="en-US" altLang="ko-KR" sz="1600" dirty="0" smtClean="0">
-                <a:solidFill>
-                  <a:schemeClr val="tx1">
-                    <a:lumMod val="75000"/>
-                    <a:lumOff val="25000"/>
-                  </a:schemeClr>
-                </a:solidFill>
-                <a:latin typeface="Tahoma" panose="020B0604030504040204" pitchFamily="34" charset="0"/>
-                <a:ea typeface="Tahoma" panose="020B0604030504040204" pitchFamily="34" charset="0"/>
-                <a:cs typeface="Tahoma" panose="020B0604030504040204" pitchFamily="34" charset="0"/>
-              </a:rPr>
-              <a:t>15HCB2 - LACTROI</a:t>
-            </a:r>
-            <a:r>
-              <a:rPr kumimoji="0" lang="en-US" altLang="ko-KR" sz="1600" dirty="0" smtClean="0">
-                <a:solidFill>
-                  <a:schemeClr val="tx1">
-                    <a:lumMod val="75000"/>
-                    <a:lumOff val="25000"/>
-                  </a:schemeClr>
-                </a:solidFill>
-                <a:latin typeface="Tahoma" panose="020B0604030504040204" pitchFamily="34" charset="0"/>
-                <a:ea typeface="Tahoma" panose="020B0604030504040204" pitchFamily="34" charset="0"/>
-                <a:cs typeface="Tahoma" panose="020B0604030504040204" pitchFamily="34" charset="0"/>
-              </a:rPr>
-              <a:t>    </a:t>
-            </a:r>
-            <a:endParaRPr kumimoji="0" lang="en-US" altLang="ko-KR" sz="1600" dirty="0">
-              <a:solidFill>
-                <a:schemeClr val="tx1">
-                  <a:lumMod val="75000"/>
-                  <a:lumOff val="25000"/>
-                </a:schemeClr>
-              </a:solidFill>
-              <a:latin typeface="Tahoma" panose="020B0604030504040204" pitchFamily="34" charset="0"/>
-              <a:ea typeface="Tahoma" panose="020B0604030504040204" pitchFamily="34" charset="0"/>
-              <a:cs typeface="Tahoma" panose="020B0604030504040204" pitchFamily="34" charset="0"/>
-            </a:endParaRPr>
-          </a:p>
-        </p:txBody>
-      </p:sp>
     </p:spTree>
     <p:extLst>
       <p:ext uri="{BB962C8B-B14F-4D97-AF65-F5344CB8AC3E}">
@@ -7297,141 +7277,32 @@
             <p:ph type="title"/>
           </p:nvPr>
         </p:nvSpPr>
-        <p:spPr/>
+        <p:spPr>
+          <a:xfrm>
+            <a:off x="1835696" y="2636912"/>
+            <a:ext cx="6768752" cy="1069514"/>
+          </a:xfrm>
+        </p:spPr>
         <p:txBody>
           <a:bodyPr/>
           <a:lstStyle/>
           <a:p>
+            <a:pPr algn="ctr"/>
             <a:r>
               <a:rPr lang="en-US" altLang="ko-KR" dirty="0" smtClean="0">
                 <a:latin typeface="Tahoma" panose="020B0604030504040204" pitchFamily="34" charset="0"/>
                 <a:ea typeface="Tahoma" panose="020B0604030504040204" pitchFamily="34" charset="0"/>
                 <a:cs typeface="Tahoma" panose="020B0604030504040204" pitchFamily="34" charset="0"/>
               </a:rPr>
-              <a:t> Click to add title</a:t>
-            </a:r>
-            <a:endParaRPr lang="ko-KR" altLang="en-US" dirty="0">
-              <a:latin typeface="Tahoma" panose="020B0604030504040204" pitchFamily="34" charset="0"/>
-              <a:cs typeface="Tahoma" panose="020B0604030504040204" pitchFamily="34" charset="0"/>
-            </a:endParaRPr>
-          </a:p>
-        </p:txBody>
-      </p:sp>
-      <p:sp>
-        <p:nvSpPr>
-          <p:cNvPr id="12" name="Content Placeholder 11"/>
-          <p:cNvSpPr>
-            <a:spLocks noGrp="1"/>
-          </p:cNvSpPr>
-          <p:nvPr>
-            <p:ph idx="1"/>
-          </p:nvPr>
-        </p:nvSpPr>
-        <p:spPr/>
-        <p:txBody>
-          <a:bodyPr/>
-          <a:lstStyle/>
-          <a:p>
-            <a:r>
-              <a:rPr lang="en-US" b="1" dirty="0">
-                <a:latin typeface="Tahoma" panose="020B0604030504040204" pitchFamily="34" charset="0"/>
-                <a:ea typeface="Tahoma" panose="020B0604030504040204" pitchFamily="34" charset="0"/>
-                <a:cs typeface="Tahoma" panose="020B0604030504040204" pitchFamily="34" charset="0"/>
-              </a:rPr>
-              <a:t>Free PPT Templates - </a:t>
-            </a:r>
-            <a:r>
-              <a:rPr lang="en-US" altLang="ko-KR" b="1" dirty="0" smtClean="0">
-                <a:latin typeface="Tahoma" panose="020B0604030504040204" pitchFamily="34" charset="0"/>
-                <a:ea typeface="Tahoma" panose="020B0604030504040204" pitchFamily="34" charset="0"/>
-                <a:cs typeface="Tahoma" panose="020B0604030504040204" pitchFamily="34" charset="0"/>
-              </a:rPr>
-              <a:t>Standard </a:t>
-            </a:r>
-            <a:r>
-              <a:rPr lang="en-US" altLang="ko-KR" b="1" dirty="0">
-                <a:latin typeface="Tahoma" panose="020B0604030504040204" pitchFamily="34" charset="0"/>
-                <a:ea typeface="Tahoma" panose="020B0604030504040204" pitchFamily="34" charset="0"/>
-                <a:cs typeface="Tahoma" panose="020B0604030504040204" pitchFamily="34" charset="0"/>
-              </a:rPr>
-              <a:t>(4:3</a:t>
-            </a:r>
-            <a:r>
-              <a:rPr lang="en-US" altLang="ko-KR" b="1" dirty="0" smtClean="0">
-                <a:latin typeface="Tahoma" panose="020B0604030504040204" pitchFamily="34" charset="0"/>
-                <a:ea typeface="Tahoma" panose="020B0604030504040204" pitchFamily="34" charset="0"/>
-                <a:cs typeface="Tahoma" panose="020B0604030504040204" pitchFamily="34" charset="0"/>
-              </a:rPr>
-              <a:t>)</a:t>
-            </a:r>
-            <a:endParaRPr lang="en-US" altLang="ko-KR" b="1" dirty="0">
-              <a:latin typeface="Tahoma" panose="020B0604030504040204" pitchFamily="34" charset="0"/>
-              <a:ea typeface="Tahoma" panose="020B0604030504040204" pitchFamily="34" charset="0"/>
-              <a:cs typeface="Tahoma" panose="020B0604030504040204" pitchFamily="34" charset="0"/>
-            </a:endParaRPr>
-          </a:p>
-        </p:txBody>
-      </p:sp>
-      <p:sp>
-        <p:nvSpPr>
-          <p:cNvPr id="13" name="Content Placeholder 12"/>
-          <p:cNvSpPr>
-            <a:spLocks noGrp="1"/>
-          </p:cNvSpPr>
-          <p:nvPr>
-            <p:ph idx="10"/>
-          </p:nvPr>
-        </p:nvSpPr>
-        <p:spPr/>
-        <p:txBody>
-          <a:bodyPr/>
-          <a:lstStyle/>
-          <a:p>
-            <a:r>
-              <a:rPr lang="en-US" altLang="ko-KR" dirty="0">
-                <a:latin typeface="Tahoma" panose="020B0604030504040204" pitchFamily="34" charset="0"/>
-                <a:ea typeface="Tahoma" panose="020B0604030504040204" pitchFamily="34" charset="0"/>
-                <a:cs typeface="Tahoma" panose="020B0604030504040204" pitchFamily="34" charset="0"/>
-              </a:rPr>
-              <a:t>This PowerPoint Template has clean and neutral design that can be adapted to any content and meets various market segments. With this many slides you are able to make a complete PowerPoint Presentation that best suit your needs. </a:t>
-            </a:r>
-          </a:p>
-          <a:p>
-            <a:pPr>
-              <a:buFont typeface="Wingdings" pitchFamily="2" charset="2"/>
-              <a:buChar char="ü"/>
-            </a:pPr>
-            <a:endParaRPr lang="en-US" altLang="ko-KR" dirty="0">
-              <a:latin typeface="Tahoma" panose="020B0604030504040204" pitchFamily="34" charset="0"/>
-              <a:ea typeface="Tahoma" panose="020B0604030504040204" pitchFamily="34" charset="0"/>
-              <a:cs typeface="Tahoma" panose="020B0604030504040204" pitchFamily="34" charset="0"/>
-            </a:endParaRPr>
-          </a:p>
-          <a:p>
-            <a:r>
-              <a:rPr lang="en-US" altLang="ko-KR" dirty="0">
-                <a:latin typeface="Tahoma" panose="020B0604030504040204" pitchFamily="34" charset="0"/>
-                <a:ea typeface="Tahoma" panose="020B0604030504040204" pitchFamily="34" charset="0"/>
-                <a:cs typeface="Tahoma" panose="020B0604030504040204" pitchFamily="34" charset="0"/>
-              </a:rPr>
-              <a:t>This PowerPoint Template has clean and neutral design that can be adapted to any content and meets various market segments. With this many slides you are able to make a complete PowerPoint Presentation that best suit your needs.</a:t>
-            </a:r>
-          </a:p>
-          <a:p>
-            <a:endParaRPr lang="en-US" altLang="ko-KR" dirty="0">
-              <a:latin typeface="Tahoma" panose="020B0604030504040204" pitchFamily="34" charset="0"/>
-              <a:ea typeface="Tahoma" panose="020B0604030504040204" pitchFamily="34" charset="0"/>
-              <a:cs typeface="Tahoma" panose="020B0604030504040204" pitchFamily="34" charset="0"/>
-            </a:endParaRPr>
-          </a:p>
-          <a:p>
-            <a:r>
-              <a:rPr lang="en-US" altLang="ko-KR" dirty="0">
-                <a:latin typeface="Tahoma" panose="020B0604030504040204" pitchFamily="34" charset="0"/>
-                <a:ea typeface="Tahoma" panose="020B0604030504040204" pitchFamily="34" charset="0"/>
-                <a:cs typeface="Tahoma" panose="020B0604030504040204" pitchFamily="34" charset="0"/>
-              </a:rPr>
-              <a:t>This PowerPoint Template has clean and neutral design that can be adapted to any content and meets various market segments. With this many slides you are able to make a complete PowerPoint Presentation that best suit your </a:t>
+              <a:t> </a:t>
+            </a:r>
+            <a:r>
+              <a:rPr lang="en-US" altLang="ko-KR" dirty="0" err="1" smtClean="0">
+                <a:latin typeface="Tahoma" panose="020B0604030504040204" pitchFamily="34" charset="0"/>
+                <a:ea typeface="Tahoma" panose="020B0604030504040204" pitchFamily="34" charset="0"/>
+                <a:cs typeface="Tahoma" panose="020B0604030504040204" pitchFamily="34" charset="0"/>
+              </a:rPr>
+              <a:t>Hỏi</a:t>
             </a:r>
             <a:r>
               <a:rPr lang="en-US" altLang="ko-KR" dirty="0" smtClean="0">
@@ -7439,40 +7310,15 @@
                 <a:ea typeface="Tahoma" panose="020B0604030504040204" pitchFamily="34" charset="0"/>
                 <a:cs typeface="Tahoma" panose="020B0604030504040204" pitchFamily="34" charset="0"/>
               </a:rPr>
-              <a:t>needs. </a:t>
-            </a:r>
-          </a:p>
-          <a:p>
-            <a:endParaRPr lang="en-US" altLang="ko-KR" dirty="0">
-              <a:latin typeface="Tahoma" panose="020B0604030504040204" pitchFamily="34" charset="0"/>
-              <a:ea typeface="Tahoma" panose="020B0604030504040204" pitchFamily="34" charset="0"/>
-              <a:cs typeface="Tahoma" panose="020B0604030504040204" pitchFamily="34" charset="0"/>
-            </a:endParaRPr>
-          </a:p>
-          <a:p>
-            <a:r>
-              <a:rPr lang="en-US" altLang="ko-KR" dirty="0" smtClean="0">
-                <a:latin typeface="Tahoma" panose="020B0604030504040204" pitchFamily="34" charset="0"/>
-                <a:ea typeface="Tahoma" panose="020B0604030504040204" pitchFamily="34" charset="0"/>
-                <a:cs typeface="Tahoma" panose="020B0604030504040204" pitchFamily="34" charset="0"/>
-              </a:rPr>
-              <a:t>This </a:t>
-            </a:r>
-            <a:r>
-              <a:rPr lang="en-US" altLang="ko-KR" dirty="0">
-                <a:latin typeface="Tahoma" panose="020B0604030504040204" pitchFamily="34" charset="0"/>
-                <a:ea typeface="Tahoma" panose="020B0604030504040204" pitchFamily="34" charset="0"/>
-                <a:cs typeface="Tahoma" panose="020B0604030504040204" pitchFamily="34" charset="0"/>
-              </a:rPr>
-              <a:t>PowerPoint Template has clean and neutral design that can be adapted to any content and meets various market segments</a:t>
-            </a:r>
-            <a:r>
-              <a:rPr lang="en-US" altLang="ko-KR" dirty="0" smtClean="0">
-                <a:latin typeface="Tahoma" panose="020B0604030504040204" pitchFamily="34" charset="0"/>
-                <a:ea typeface="Tahoma" panose="020B0604030504040204" pitchFamily="34" charset="0"/>
-                <a:cs typeface="Tahoma" panose="020B0604030504040204" pitchFamily="34" charset="0"/>
-              </a:rPr>
-              <a:t>.</a:t>
+              <a:t> </a:t>
+            </a:r>
+            <a:r>
+              <a:rPr lang="en-US" altLang="ko-KR" dirty="0" err="1" smtClean="0">
+                <a:latin typeface="Tahoma" panose="020B0604030504040204" pitchFamily="34" charset="0"/>
+                <a:ea typeface="Tahoma" panose="020B0604030504040204" pitchFamily="34" charset="0"/>
+                <a:cs typeface="Tahoma" panose="020B0604030504040204" pitchFamily="34" charset="0"/>
+              </a:rPr>
+              <a:t>đáp</a:t>
             </a:r>
             <a:endParaRPr lang="ko-KR" altLang="en-US" dirty="0">
               <a:latin typeface="Tahoma" panose="020B0604030504040204" pitchFamily="34" charset="0"/>

</xml_diff>